<commit_message>
Fix :: Reusable function
</commit_message>
<xml_diff>
--- a/Flowchart/flowchart.pptx
+++ b/Flowchart/flowchart.pptx
@@ -7,11 +7,13 @@
   <p:sldIdLst>
     <p:sldId id="256" r:id="rId2"/>
     <p:sldId id="257" r:id="rId3"/>
-    <p:sldId id="258" r:id="rId4"/>
-    <p:sldId id="259" r:id="rId5"/>
-    <p:sldId id="260" r:id="rId6"/>
-    <p:sldId id="261" r:id="rId7"/>
-    <p:sldId id="262" r:id="rId8"/>
+    <p:sldId id="263" r:id="rId4"/>
+    <p:sldId id="264" r:id="rId5"/>
+    <p:sldId id="258" r:id="rId6"/>
+    <p:sldId id="259" r:id="rId7"/>
+    <p:sldId id="260" r:id="rId8"/>
+    <p:sldId id="261" r:id="rId9"/>
+    <p:sldId id="262" r:id="rId10"/>
   </p:sldIdLst>
   <p:sldSz cx="9144000" cy="6858000" type="screen4x3"/>
   <p:notesSz cx="6858000" cy="9144000"/>
@@ -249,7 +251,7 @@
           <a:p>
             <a:fld id="{6669E39F-C2FD-E542-8E4C-F57CA47EB378}" type="datetimeFigureOut">
               <a:rPr lang="en-US" smtClean="0"/>
-              <a:t>9/15/24</a:t>
+              <a:t>9/18/24</a:t>
             </a:fld>
             <a:endParaRPr lang="en-US"/>
           </a:p>
@@ -419,7 +421,7 @@
           <a:p>
             <a:fld id="{6669E39F-C2FD-E542-8E4C-F57CA47EB378}" type="datetimeFigureOut">
               <a:rPr lang="en-US" smtClean="0"/>
-              <a:t>9/15/24</a:t>
+              <a:t>9/18/24</a:t>
             </a:fld>
             <a:endParaRPr lang="en-US"/>
           </a:p>
@@ -599,7 +601,7 @@
           <a:p>
             <a:fld id="{6669E39F-C2FD-E542-8E4C-F57CA47EB378}" type="datetimeFigureOut">
               <a:rPr lang="en-US" smtClean="0"/>
-              <a:t>9/15/24</a:t>
+              <a:t>9/18/24</a:t>
             </a:fld>
             <a:endParaRPr lang="en-US"/>
           </a:p>
@@ -769,7 +771,7 @@
           <a:p>
             <a:fld id="{6669E39F-C2FD-E542-8E4C-F57CA47EB378}" type="datetimeFigureOut">
               <a:rPr lang="en-US" smtClean="0"/>
-              <a:t>9/15/24</a:t>
+              <a:t>9/18/24</a:t>
             </a:fld>
             <a:endParaRPr lang="en-US"/>
           </a:p>
@@ -1015,7 +1017,7 @@
           <a:p>
             <a:fld id="{6669E39F-C2FD-E542-8E4C-F57CA47EB378}" type="datetimeFigureOut">
               <a:rPr lang="en-US" smtClean="0"/>
-              <a:t>9/15/24</a:t>
+              <a:t>9/18/24</a:t>
             </a:fld>
             <a:endParaRPr lang="en-US"/>
           </a:p>
@@ -1247,7 +1249,7 @@
           <a:p>
             <a:fld id="{6669E39F-C2FD-E542-8E4C-F57CA47EB378}" type="datetimeFigureOut">
               <a:rPr lang="en-US" smtClean="0"/>
-              <a:t>9/15/24</a:t>
+              <a:t>9/18/24</a:t>
             </a:fld>
             <a:endParaRPr lang="en-US"/>
           </a:p>
@@ -1614,7 +1616,7 @@
           <a:p>
             <a:fld id="{6669E39F-C2FD-E542-8E4C-F57CA47EB378}" type="datetimeFigureOut">
               <a:rPr lang="en-US" smtClean="0"/>
-              <a:t>9/15/24</a:t>
+              <a:t>9/18/24</a:t>
             </a:fld>
             <a:endParaRPr lang="en-US"/>
           </a:p>
@@ -1732,7 +1734,7 @@
           <a:p>
             <a:fld id="{6669E39F-C2FD-E542-8E4C-F57CA47EB378}" type="datetimeFigureOut">
               <a:rPr lang="en-US" smtClean="0"/>
-              <a:t>9/15/24</a:t>
+              <a:t>9/18/24</a:t>
             </a:fld>
             <a:endParaRPr lang="en-US"/>
           </a:p>
@@ -1827,7 +1829,7 @@
           <a:p>
             <a:fld id="{6669E39F-C2FD-E542-8E4C-F57CA47EB378}" type="datetimeFigureOut">
               <a:rPr lang="en-US" smtClean="0"/>
-              <a:t>9/15/24</a:t>
+              <a:t>9/18/24</a:t>
             </a:fld>
             <a:endParaRPr lang="en-US"/>
           </a:p>
@@ -2104,7 +2106,7 @@
           <a:p>
             <a:fld id="{6669E39F-C2FD-E542-8E4C-F57CA47EB378}" type="datetimeFigureOut">
               <a:rPr lang="en-US" smtClean="0"/>
-              <a:t>9/15/24</a:t>
+              <a:t>9/18/24</a:t>
             </a:fld>
             <a:endParaRPr lang="en-US"/>
           </a:p>
@@ -2361,7 +2363,7 @@
           <a:p>
             <a:fld id="{6669E39F-C2FD-E542-8E4C-F57CA47EB378}" type="datetimeFigureOut">
               <a:rPr lang="en-US" smtClean="0"/>
-              <a:t>9/15/24</a:t>
+              <a:t>9/18/24</a:t>
             </a:fld>
             <a:endParaRPr lang="en-US"/>
           </a:p>
@@ -2574,7 +2576,7 @@
           <a:p>
             <a:fld id="{6669E39F-C2FD-E542-8E4C-F57CA47EB378}" type="datetimeFigureOut">
               <a:rPr lang="en-US" smtClean="0"/>
-              <a:t>9/15/24</a:t>
+              <a:t>9/18/24</a:t>
             </a:fld>
             <a:endParaRPr lang="en-US"/>
           </a:p>
@@ -3066,10 +3068,10 @@
       </p:sp>
       <p:pic>
         <p:nvPicPr>
-          <p:cNvPr id="5" name="Content Placeholder 4">
+          <p:cNvPr id="7" name="Content Placeholder 6" descr="A diagram of a program&#10;&#10;Description automatically generated">
             <a:extLst>
               <a:ext uri="{FF2B5EF4-FFF2-40B4-BE49-F238E27FC236}">
-                <a16:creationId xmlns:a16="http://schemas.microsoft.com/office/drawing/2014/main" id="{BFC982DD-4FB1-F62F-C9EC-D3EA68317CD4}"/>
+                <a16:creationId xmlns:a16="http://schemas.microsoft.com/office/drawing/2014/main" id="{1807B5EB-F773-F0AD-6014-F5C846F76F79}"/>
               </a:ext>
             </a:extLst>
           </p:cNvPr>
@@ -3082,13 +3084,14 @@
         </p:nvPicPr>
         <p:blipFill>
           <a:blip r:embed="rId2"/>
-          <a:srcRect/>
-          <a:stretch/>
+          <a:stretch>
+            <a:fillRect/>
+          </a:stretch>
         </p:blipFill>
         <p:spPr>
           <a:xfrm>
-            <a:off x="2986548" y="0"/>
-            <a:ext cx="3170903" cy="6858001"/>
+            <a:off x="1996706" y="0"/>
+            <a:ext cx="5150589" cy="6867452"/>
           </a:xfrm>
         </p:spPr>
       </p:pic>
@@ -3149,6 +3152,174 @@
       </p:sp>
       <p:pic>
         <p:nvPicPr>
+          <p:cNvPr id="6" name="Content Placeholder 5" descr="A diagram of a flowchart&#10;&#10;Description automatically generated">
+            <a:extLst>
+              <a:ext uri="{FF2B5EF4-FFF2-40B4-BE49-F238E27FC236}">
+                <a16:creationId xmlns:a16="http://schemas.microsoft.com/office/drawing/2014/main" id="{D592717F-211D-B7B4-A067-C1BBD06DD10D}"/>
+              </a:ext>
+            </a:extLst>
+          </p:cNvPr>
+          <p:cNvPicPr>
+            <a:picLocks noGrp="1" noChangeAspect="1"/>
+          </p:cNvPicPr>
+          <p:nvPr>
+            <p:ph idx="1"/>
+          </p:nvPr>
+        </p:nvPicPr>
+        <p:blipFill>
+          <a:blip r:embed="rId2"/>
+          <a:stretch>
+            <a:fillRect/>
+          </a:stretch>
+        </p:blipFill>
+        <p:spPr>
+          <a:xfrm>
+            <a:off x="2982433" y="-12867"/>
+            <a:ext cx="3179135" cy="6888129"/>
+          </a:xfrm>
+        </p:spPr>
+      </p:pic>
+    </p:spTree>
+    <p:extLst>
+      <p:ext uri="{BB962C8B-B14F-4D97-AF65-F5344CB8AC3E}">
+        <p14:creationId xmlns:p14="http://schemas.microsoft.com/office/powerpoint/2010/main" val="2296866058"/>
+      </p:ext>
+    </p:extLst>
+  </p:cSld>
+  <p:clrMapOvr>
+    <a:masterClrMapping/>
+  </p:clrMapOvr>
+</p:sld>
+</file>
+
+<file path=ppt/slides/slide4.xml><?xml version="1.0" encoding="utf-8"?>
+<p:sld xmlns:a="http://schemas.openxmlformats.org/drawingml/2006/main" xmlns:r="http://schemas.openxmlformats.org/officeDocument/2006/relationships" xmlns:p="http://schemas.openxmlformats.org/presentationml/2006/main">
+  <p:cSld>
+    <p:spTree>
+      <p:nvGrpSpPr>
+        <p:cNvPr id="1" name=""/>
+        <p:cNvGrpSpPr/>
+        <p:nvPr/>
+      </p:nvGrpSpPr>
+      <p:grpSpPr>
+        <a:xfrm>
+          <a:off x="0" y="0"/>
+          <a:ext cx="0" cy="0"/>
+          <a:chOff x="0" y="0"/>
+          <a:chExt cx="0" cy="0"/>
+        </a:xfrm>
+      </p:grpSpPr>
+      <p:sp>
+        <p:nvSpPr>
+          <p:cNvPr id="2" name="Title 1">
+            <a:extLst>
+              <a:ext uri="{FF2B5EF4-FFF2-40B4-BE49-F238E27FC236}">
+                <a16:creationId xmlns:a16="http://schemas.microsoft.com/office/drawing/2014/main" id="{7496E57A-4C97-7FC5-2462-77B7A3CEDF23}"/>
+              </a:ext>
+            </a:extLst>
+          </p:cNvPr>
+          <p:cNvSpPr>
+            <a:spLocks noGrp="1"/>
+          </p:cNvSpPr>
+          <p:nvPr>
+            <p:ph type="title"/>
+          </p:nvPr>
+        </p:nvSpPr>
+        <p:spPr/>
+        <p:txBody>
+          <a:bodyPr/>
+          <a:lstStyle/>
+          <a:p>
+            <a:endParaRPr lang="en-US"/>
+          </a:p>
+        </p:txBody>
+      </p:sp>
+      <p:pic>
+        <p:nvPicPr>
+          <p:cNvPr id="7" name="Content Placeholder 6" descr="A diagram of a software system&#10;&#10;Description automatically generated">
+            <a:extLst>
+              <a:ext uri="{FF2B5EF4-FFF2-40B4-BE49-F238E27FC236}">
+                <a16:creationId xmlns:a16="http://schemas.microsoft.com/office/drawing/2014/main" id="{147D8E7B-6DAF-5090-192A-DCB519DF9EF2}"/>
+              </a:ext>
+            </a:extLst>
+          </p:cNvPr>
+          <p:cNvPicPr>
+            <a:picLocks noGrp="1" noChangeAspect="1"/>
+          </p:cNvPicPr>
+          <p:nvPr>
+            <p:ph idx="1"/>
+          </p:nvPr>
+        </p:nvPicPr>
+        <p:blipFill>
+          <a:blip r:embed="rId2"/>
+          <a:stretch>
+            <a:fillRect/>
+          </a:stretch>
+        </p:blipFill>
+        <p:spPr>
+          <a:xfrm>
+            <a:off x="1701209" y="0"/>
+            <a:ext cx="5741581" cy="6858000"/>
+          </a:xfrm>
+        </p:spPr>
+      </p:pic>
+    </p:spTree>
+    <p:extLst>
+      <p:ext uri="{BB962C8B-B14F-4D97-AF65-F5344CB8AC3E}">
+        <p14:creationId xmlns:p14="http://schemas.microsoft.com/office/powerpoint/2010/main" val="1463553965"/>
+      </p:ext>
+    </p:extLst>
+  </p:cSld>
+  <p:clrMapOvr>
+    <a:masterClrMapping/>
+  </p:clrMapOvr>
+</p:sld>
+</file>
+
+<file path=ppt/slides/slide5.xml><?xml version="1.0" encoding="utf-8"?>
+<p:sld xmlns:a="http://schemas.openxmlformats.org/drawingml/2006/main" xmlns:r="http://schemas.openxmlformats.org/officeDocument/2006/relationships" xmlns:p="http://schemas.openxmlformats.org/presentationml/2006/main">
+  <p:cSld>
+    <p:spTree>
+      <p:nvGrpSpPr>
+        <p:cNvPr id="1" name=""/>
+        <p:cNvGrpSpPr/>
+        <p:nvPr/>
+      </p:nvGrpSpPr>
+      <p:grpSpPr>
+        <a:xfrm>
+          <a:off x="0" y="0"/>
+          <a:ext cx="0" cy="0"/>
+          <a:chOff x="0" y="0"/>
+          <a:chExt cx="0" cy="0"/>
+        </a:xfrm>
+      </p:grpSpPr>
+      <p:sp>
+        <p:nvSpPr>
+          <p:cNvPr id="2" name="Title 1">
+            <a:extLst>
+              <a:ext uri="{FF2B5EF4-FFF2-40B4-BE49-F238E27FC236}">
+                <a16:creationId xmlns:a16="http://schemas.microsoft.com/office/drawing/2014/main" id="{7496E57A-4C97-7FC5-2462-77B7A3CEDF23}"/>
+              </a:ext>
+            </a:extLst>
+          </p:cNvPr>
+          <p:cNvSpPr>
+            <a:spLocks noGrp="1"/>
+          </p:cNvSpPr>
+          <p:nvPr>
+            <p:ph type="title"/>
+          </p:nvPr>
+        </p:nvSpPr>
+        <p:spPr/>
+        <p:txBody>
+          <a:bodyPr/>
+          <a:lstStyle/>
+          <a:p>
+            <a:endParaRPr lang="en-US"/>
+          </a:p>
+        </p:txBody>
+      </p:sp>
+      <p:pic>
+        <p:nvPicPr>
           <p:cNvPr id="8" name="Content Placeholder 7" descr="A diagram of a flowchart&#10;&#10;Description automatically generated">
             <a:extLst>
               <a:ext uri="{FF2B5EF4-FFF2-40B4-BE49-F238E27FC236}">
@@ -3189,7 +3360,7 @@
 </p:sld>
 </file>
 
-<file path=ppt/slides/slide4.xml><?xml version="1.0" encoding="utf-8"?>
+<file path=ppt/slides/slide6.xml><?xml version="1.0" encoding="utf-8"?>
 <p:sld xmlns:a="http://schemas.openxmlformats.org/drawingml/2006/main" xmlns:r="http://schemas.openxmlformats.org/officeDocument/2006/relationships" xmlns:p="http://schemas.openxmlformats.org/presentationml/2006/main">
   <p:cSld>
     <p:spTree>
@@ -3272,7 +3443,7 @@
 </p:sld>
 </file>
 
-<file path=ppt/slides/slide5.xml><?xml version="1.0" encoding="utf-8"?>
+<file path=ppt/slides/slide7.xml><?xml version="1.0" encoding="utf-8"?>
 <p:sld xmlns:a="http://schemas.openxmlformats.org/drawingml/2006/main" xmlns:r="http://schemas.openxmlformats.org/officeDocument/2006/relationships" xmlns:p="http://schemas.openxmlformats.org/presentationml/2006/main">
   <p:cSld>
     <p:spTree>
@@ -3355,7 +3526,7 @@
 </p:sld>
 </file>
 
-<file path=ppt/slides/slide6.xml><?xml version="1.0" encoding="utf-8"?>
+<file path=ppt/slides/slide8.xml><?xml version="1.0" encoding="utf-8"?>
 <p:sld xmlns:a="http://schemas.openxmlformats.org/drawingml/2006/main" xmlns:r="http://schemas.openxmlformats.org/officeDocument/2006/relationships" xmlns:p="http://schemas.openxmlformats.org/presentationml/2006/main">
   <p:cSld>
     <p:spTree>
@@ -3439,7 +3610,7 @@
 </p:sld>
 </file>
 
-<file path=ppt/slides/slide7.xml><?xml version="1.0" encoding="utf-8"?>
+<file path=ppt/slides/slide9.xml><?xml version="1.0" encoding="utf-8"?>
 <p:sld xmlns:a="http://schemas.openxmlformats.org/drawingml/2006/main" xmlns:r="http://schemas.openxmlformats.org/officeDocument/2006/relationships" xmlns:p="http://schemas.openxmlformats.org/presentationml/2006/main">
   <p:cSld>
     <p:spTree>

</xml_diff>